<commit_message>
fonts lokal, text intro geändert
</commit_message>
<xml_diff>
--- a/Präsentation1.pptx
+++ b/Präsentation1.pptx
@@ -265,7 +265,7 @@
           <a:p>
             <a:fld id="{214CDD6E-AB4F-4578-A4B2-B8D3EAA6E46D}" type="datetimeFigureOut">
               <a:rPr lang="de-DE" smtClean="0"/>
-              <a:t>15.09.2025</a:t>
+              <a:t>19.09.2025</a:t>
             </a:fld>
             <a:endParaRPr lang="de-DE"/>
           </a:p>
@@ -463,7 +463,7 @@
           <a:p>
             <a:fld id="{214CDD6E-AB4F-4578-A4B2-B8D3EAA6E46D}" type="datetimeFigureOut">
               <a:rPr lang="de-DE" smtClean="0"/>
-              <a:t>15.09.2025</a:t>
+              <a:t>19.09.2025</a:t>
             </a:fld>
             <a:endParaRPr lang="de-DE"/>
           </a:p>
@@ -671,7 +671,7 @@
           <a:p>
             <a:fld id="{214CDD6E-AB4F-4578-A4B2-B8D3EAA6E46D}" type="datetimeFigureOut">
               <a:rPr lang="de-DE" smtClean="0"/>
-              <a:t>15.09.2025</a:t>
+              <a:t>19.09.2025</a:t>
             </a:fld>
             <a:endParaRPr lang="de-DE"/>
           </a:p>
@@ -869,7 +869,7 @@
           <a:p>
             <a:fld id="{214CDD6E-AB4F-4578-A4B2-B8D3EAA6E46D}" type="datetimeFigureOut">
               <a:rPr lang="de-DE" smtClean="0"/>
-              <a:t>15.09.2025</a:t>
+              <a:t>19.09.2025</a:t>
             </a:fld>
             <a:endParaRPr lang="de-DE"/>
           </a:p>
@@ -1144,7 +1144,7 @@
           <a:p>
             <a:fld id="{214CDD6E-AB4F-4578-A4B2-B8D3EAA6E46D}" type="datetimeFigureOut">
               <a:rPr lang="de-DE" smtClean="0"/>
-              <a:t>15.09.2025</a:t>
+              <a:t>19.09.2025</a:t>
             </a:fld>
             <a:endParaRPr lang="de-DE"/>
           </a:p>
@@ -1409,7 +1409,7 @@
           <a:p>
             <a:fld id="{214CDD6E-AB4F-4578-A4B2-B8D3EAA6E46D}" type="datetimeFigureOut">
               <a:rPr lang="de-DE" smtClean="0"/>
-              <a:t>15.09.2025</a:t>
+              <a:t>19.09.2025</a:t>
             </a:fld>
             <a:endParaRPr lang="de-DE"/>
           </a:p>
@@ -1821,7 +1821,7 @@
           <a:p>
             <a:fld id="{214CDD6E-AB4F-4578-A4B2-B8D3EAA6E46D}" type="datetimeFigureOut">
               <a:rPr lang="de-DE" smtClean="0"/>
-              <a:t>15.09.2025</a:t>
+              <a:t>19.09.2025</a:t>
             </a:fld>
             <a:endParaRPr lang="de-DE"/>
           </a:p>
@@ -1962,7 +1962,7 @@
           <a:p>
             <a:fld id="{214CDD6E-AB4F-4578-A4B2-B8D3EAA6E46D}" type="datetimeFigureOut">
               <a:rPr lang="de-DE" smtClean="0"/>
-              <a:t>15.09.2025</a:t>
+              <a:t>19.09.2025</a:t>
             </a:fld>
             <a:endParaRPr lang="de-DE"/>
           </a:p>
@@ -2075,7 +2075,7 @@
           <a:p>
             <a:fld id="{214CDD6E-AB4F-4578-A4B2-B8D3EAA6E46D}" type="datetimeFigureOut">
               <a:rPr lang="de-DE" smtClean="0"/>
-              <a:t>15.09.2025</a:t>
+              <a:t>19.09.2025</a:t>
             </a:fld>
             <a:endParaRPr lang="de-DE"/>
           </a:p>
@@ -2386,7 +2386,7 @@
           <a:p>
             <a:fld id="{214CDD6E-AB4F-4578-A4B2-B8D3EAA6E46D}" type="datetimeFigureOut">
               <a:rPr lang="de-DE" smtClean="0"/>
-              <a:t>15.09.2025</a:t>
+              <a:t>19.09.2025</a:t>
             </a:fld>
             <a:endParaRPr lang="de-DE"/>
           </a:p>
@@ -2674,7 +2674,7 @@
           <a:p>
             <a:fld id="{214CDD6E-AB4F-4578-A4B2-B8D3EAA6E46D}" type="datetimeFigureOut">
               <a:rPr lang="de-DE" smtClean="0"/>
-              <a:t>15.09.2025</a:t>
+              <a:t>19.09.2025</a:t>
             </a:fld>
             <a:endParaRPr lang="de-DE"/>
           </a:p>
@@ -2915,7 +2915,7 @@
           <a:p>
             <a:fld id="{214CDD6E-AB4F-4578-A4B2-B8D3EAA6E46D}" type="datetimeFigureOut">
               <a:rPr lang="de-DE" smtClean="0"/>
-              <a:t>15.09.2025</a:t>
+              <a:t>19.09.2025</a:t>
             </a:fld>
             <a:endParaRPr lang="de-DE"/>
           </a:p>
@@ -6237,15 +6237,20 @@
           <a:lstStyle/>
           <a:p>
             <a:r>
+              <a:rPr lang="de-DE" dirty="0" err="1"/>
+              <a:t>Bplaced</a:t>
+            </a:r>
+            <a:r>
               <a:rPr lang="de-DE" dirty="0"/>
-              <a:t>Header</a:t>
-            </a:r>
-          </a:p>
-          <a:p>
-            <a:r>
-              <a:rPr lang="de-DE" dirty="0"/>
-              <a:t>abschnitte</a:t>
-            </a:r>
+              <a:t> – kostenloser </a:t>
+            </a:r>
+            <a:r>
+              <a:rPr lang="de-DE"/>
+              <a:t>Hostingservice</a:t>
+            </a:r>
+          </a:p>
+          <a:p>
+            <a:endParaRPr lang="de-DE" dirty="0"/>
           </a:p>
         </p:txBody>
       </p:sp>

</xml_diff>